<commit_message>
Begin building parameters in R; add all regions aggregation in derived/trade
</commit_message>
<xml_diff>
--- a/presentations/Update_2019-06-28.pptx
+++ b/presentations/Update_2019-06-28.pptx
@@ -270,7 +270,7 @@
           <a:p>
             <a:fld id="{E7645487-47E7-426D-ABE3-F7B06940B163}" type="datetimeFigureOut">
               <a:rPr lang="en-AT" smtClean="0"/>
-              <a:t>27/06/2019</a:t>
+              <a:t>28/06/2019</a:t>
             </a:fld>
             <a:endParaRPr lang="en-AT"/>
           </a:p>
@@ -470,7 +470,7 @@
           <a:p>
             <a:fld id="{E7645487-47E7-426D-ABE3-F7B06940B163}" type="datetimeFigureOut">
               <a:rPr lang="en-AT" smtClean="0"/>
-              <a:t>27/06/2019</a:t>
+              <a:t>28/06/2019</a:t>
             </a:fld>
             <a:endParaRPr lang="en-AT"/>
           </a:p>
@@ -680,7 +680,7 @@
           <a:p>
             <a:fld id="{E7645487-47E7-426D-ABE3-F7B06940B163}" type="datetimeFigureOut">
               <a:rPr lang="en-AT" smtClean="0"/>
-              <a:t>27/06/2019</a:t>
+              <a:t>28/06/2019</a:t>
             </a:fld>
             <a:endParaRPr lang="en-AT"/>
           </a:p>
@@ -880,7 +880,7 @@
           <a:p>
             <a:fld id="{E7645487-47E7-426D-ABE3-F7B06940B163}" type="datetimeFigureOut">
               <a:rPr lang="en-AT" smtClean="0"/>
-              <a:t>27/06/2019</a:t>
+              <a:t>28/06/2019</a:t>
             </a:fld>
             <a:endParaRPr lang="en-AT"/>
           </a:p>
@@ -1156,7 +1156,7 @@
           <a:p>
             <a:fld id="{E7645487-47E7-426D-ABE3-F7B06940B163}" type="datetimeFigureOut">
               <a:rPr lang="en-AT" smtClean="0"/>
-              <a:t>27/06/2019</a:t>
+              <a:t>28/06/2019</a:t>
             </a:fld>
             <a:endParaRPr lang="en-AT"/>
           </a:p>
@@ -1424,7 +1424,7 @@
           <a:p>
             <a:fld id="{E7645487-47E7-426D-ABE3-F7B06940B163}" type="datetimeFigureOut">
               <a:rPr lang="en-AT" smtClean="0"/>
-              <a:t>27/06/2019</a:t>
+              <a:t>28/06/2019</a:t>
             </a:fld>
             <a:endParaRPr lang="en-AT"/>
           </a:p>
@@ -1839,7 +1839,7 @@
           <a:p>
             <a:fld id="{E7645487-47E7-426D-ABE3-F7B06940B163}" type="datetimeFigureOut">
               <a:rPr lang="en-AT" smtClean="0"/>
-              <a:t>27/06/2019</a:t>
+              <a:t>28/06/2019</a:t>
             </a:fld>
             <a:endParaRPr lang="en-AT"/>
           </a:p>
@@ -1981,7 +1981,7 @@
           <a:p>
             <a:fld id="{E7645487-47E7-426D-ABE3-F7B06940B163}" type="datetimeFigureOut">
               <a:rPr lang="en-AT" smtClean="0"/>
-              <a:t>27/06/2019</a:t>
+              <a:t>28/06/2019</a:t>
             </a:fld>
             <a:endParaRPr lang="en-AT"/>
           </a:p>
@@ -2094,7 +2094,7 @@
           <a:p>
             <a:fld id="{E7645487-47E7-426D-ABE3-F7B06940B163}" type="datetimeFigureOut">
               <a:rPr lang="en-AT" smtClean="0"/>
-              <a:t>27/06/2019</a:t>
+              <a:t>28/06/2019</a:t>
             </a:fld>
             <a:endParaRPr lang="en-AT"/>
           </a:p>
@@ -2407,7 +2407,7 @@
           <a:p>
             <a:fld id="{E7645487-47E7-426D-ABE3-F7B06940B163}" type="datetimeFigureOut">
               <a:rPr lang="en-AT" smtClean="0"/>
-              <a:t>27/06/2019</a:t>
+              <a:t>28/06/2019</a:t>
             </a:fld>
             <a:endParaRPr lang="en-AT"/>
           </a:p>
@@ -2696,7 +2696,7 @@
           <a:p>
             <a:fld id="{E7645487-47E7-426D-ABE3-F7B06940B163}" type="datetimeFigureOut">
               <a:rPr lang="en-AT" smtClean="0"/>
-              <a:t>27/06/2019</a:t>
+              <a:t>28/06/2019</a:t>
             </a:fld>
             <a:endParaRPr lang="en-AT"/>
           </a:p>
@@ -2939,7 +2939,7 @@
           <a:p>
             <a:fld id="{E7645487-47E7-426D-ABE3-F7B06940B163}" type="datetimeFigureOut">
               <a:rPr lang="en-AT" smtClean="0"/>
-              <a:t>27/06/2019</a:t>
+              <a:t>28/06/2019</a:t>
             </a:fld>
             <a:endParaRPr lang="en-AT"/>
           </a:p>
@@ -13457,42 +13457,762 @@
       </p:sp>
       <p:sp>
         <p:nvSpPr>
-          <p:cNvPr id="3" name="Content Placeholder 2">
+          <p:cNvPr id="4" name="TextBox 3">
             <a:extLst>
               <a:ext uri="{FF2B5EF4-FFF2-40B4-BE49-F238E27FC236}">
-                <a16:creationId xmlns:a16="http://schemas.microsoft.com/office/drawing/2014/main" id="{0C1BA7AE-A300-466B-A6FE-4E1A43FC9479}"/>
+                <a16:creationId xmlns:a16="http://schemas.microsoft.com/office/drawing/2014/main" id="{90280639-B342-409E-B594-86A76BB31432}"/>
               </a:ext>
             </a:extLst>
           </p:cNvPr>
-          <p:cNvSpPr>
-            <a:spLocks noGrp="1"/>
-          </p:cNvSpPr>
-          <p:nvPr>
-            <p:ph idx="1"/>
-          </p:nvPr>
+          <p:cNvSpPr txBox="1"/>
+          <p:nvPr/>
         </p:nvSpPr>
-        <p:spPr/>
+        <p:spPr>
+          <a:xfrm>
+            <a:off x="671118" y="1771686"/>
+            <a:ext cx="4236441" cy="923330"/>
+          </a:xfrm>
+          <a:prstGeom prst="rect">
+            <a:avLst/>
+          </a:prstGeom>
+          <a:noFill/>
+          <a:ln>
+            <a:solidFill>
+              <a:schemeClr val="tx1"/>
+            </a:solidFill>
+          </a:ln>
+        </p:spPr>
         <p:txBody>
-          <a:bodyPr/>
+          <a:bodyPr wrap="square" rtlCol="0">
+            <a:spAutoFit/>
+          </a:bodyPr>
           <a:lstStyle/>
           <a:p>
-            <a:pPr lvl="1"/>
-            <a:endParaRPr lang="en-US" dirty="0"/>
-          </a:p>
-          <a:p>
-            <a:pPr lvl="1"/>
-            <a:endParaRPr lang="en-US" dirty="0"/>
-          </a:p>
-          <a:p>
-            <a:pPr lvl="1"/>
-            <a:endParaRPr lang="en-US" dirty="0"/>
-          </a:p>
-          <a:p>
-            <a:pPr lvl="1"/>
+            <a:r>
+              <a:rPr lang="en-US" b="1" dirty="0"/>
+              <a:t>Regression analysis: </a:t>
+            </a:r>
+          </a:p>
+          <a:p>
+            <a:r>
+              <a:rPr lang="en-US" dirty="0"/>
+              <a:t>Determine coefficient of cost components (e.g. distance) on energy cost ($/</a:t>
+            </a:r>
+            <a:r>
+              <a:rPr lang="en-US" dirty="0" err="1"/>
+              <a:t>GWa</a:t>
+            </a:r>
+            <a:r>
+              <a:rPr lang="en-US" dirty="0"/>
+              <a:t>)</a:t>
+            </a:r>
             <a:endParaRPr lang="en-AT" dirty="0"/>
           </a:p>
         </p:txBody>
       </p:sp>
+      <p:sp>
+        <p:nvSpPr>
+          <p:cNvPr id="8" name="TextBox 7">
+            <a:extLst>
+              <a:ext uri="{FF2B5EF4-FFF2-40B4-BE49-F238E27FC236}">
+                <a16:creationId xmlns:a16="http://schemas.microsoft.com/office/drawing/2014/main" id="{643E394D-A82A-4C06-AD1B-E448C50D562D}"/>
+              </a:ext>
+            </a:extLst>
+          </p:cNvPr>
+          <p:cNvSpPr txBox="1"/>
+          <p:nvPr/>
+        </p:nvSpPr>
+        <p:spPr>
+          <a:xfrm>
+            <a:off x="671116" y="4198182"/>
+            <a:ext cx="4236441" cy="923330"/>
+          </a:xfrm>
+          <a:prstGeom prst="rect">
+            <a:avLst/>
+          </a:prstGeom>
+          <a:noFill/>
+          <a:ln>
+            <a:solidFill>
+              <a:schemeClr val="tx1"/>
+            </a:solidFill>
+          </a:ln>
+        </p:spPr>
+        <p:txBody>
+          <a:bodyPr wrap="square" rtlCol="0">
+            <a:spAutoFit/>
+          </a:bodyPr>
+          <a:lstStyle/>
+          <a:p>
+            <a:r>
+              <a:rPr lang="en-US" b="1" dirty="0"/>
+              <a:t>Generate </a:t>
+            </a:r>
+            <a:r>
+              <a:rPr lang="en-US" b="1" dirty="0" err="1"/>
+              <a:t>var_cost</a:t>
+            </a:r>
+            <a:r>
+              <a:rPr lang="en-US" b="1" dirty="0"/>
+              <a:t> parameters:</a:t>
+            </a:r>
+          </a:p>
+          <a:p>
+            <a:r>
+              <a:rPr lang="en-US" dirty="0"/>
+              <a:t>Importer </a:t>
+            </a:r>
+            <a:r>
+              <a:rPr lang="en-US" dirty="0" err="1"/>
+              <a:t>var_cost</a:t>
+            </a:r>
+            <a:r>
+              <a:rPr lang="en-US" dirty="0"/>
+              <a:t> based on trade scenario and coefficients</a:t>
+            </a:r>
+            <a:endParaRPr lang="en-AT" dirty="0"/>
+          </a:p>
+        </p:txBody>
+      </p:sp>
+      <p:sp>
+        <p:nvSpPr>
+          <p:cNvPr id="9" name="TextBox 8">
+            <a:extLst>
+              <a:ext uri="{FF2B5EF4-FFF2-40B4-BE49-F238E27FC236}">
+                <a16:creationId xmlns:a16="http://schemas.microsoft.com/office/drawing/2014/main" id="{A67CD8CD-7867-46F2-BA2B-C935E0C23696}"/>
+              </a:ext>
+            </a:extLst>
+          </p:cNvPr>
+          <p:cNvSpPr txBox="1"/>
+          <p:nvPr/>
+        </p:nvSpPr>
+        <p:spPr>
+          <a:xfrm>
+            <a:off x="671117" y="2987566"/>
+            <a:ext cx="4236441" cy="923330"/>
+          </a:xfrm>
+          <a:prstGeom prst="rect">
+            <a:avLst/>
+          </a:prstGeom>
+          <a:noFill/>
+          <a:ln>
+            <a:solidFill>
+              <a:schemeClr val="tx1"/>
+            </a:solidFill>
+          </a:ln>
+        </p:spPr>
+        <p:txBody>
+          <a:bodyPr wrap="square" rtlCol="0">
+            <a:spAutoFit/>
+          </a:bodyPr>
+          <a:lstStyle/>
+          <a:p>
+            <a:r>
+              <a:rPr lang="en-US" b="1" dirty="0"/>
+              <a:t>Identify trade scenarios:</a:t>
+            </a:r>
+          </a:p>
+          <a:p>
+            <a:r>
+              <a:rPr lang="en-US" dirty="0"/>
+              <a:t>Example: many trade disputes, high regional conflict</a:t>
+            </a:r>
+            <a:endParaRPr lang="en-AT" dirty="0"/>
+          </a:p>
+        </p:txBody>
+      </p:sp>
+      <p:pic>
+        <p:nvPicPr>
+          <p:cNvPr id="11" name="Picture 10">
+            <a:extLst>
+              <a:ext uri="{FF2B5EF4-FFF2-40B4-BE49-F238E27FC236}">
+                <a16:creationId xmlns:a16="http://schemas.microsoft.com/office/drawing/2014/main" id="{CB2F065B-D1A3-404E-A458-CB169F7420E6}"/>
+              </a:ext>
+            </a:extLst>
+          </p:cNvPr>
+          <p:cNvPicPr>
+            <a:picLocks noChangeAspect="1"/>
+          </p:cNvPicPr>
+          <p:nvPr/>
+        </p:nvPicPr>
+        <p:blipFill>
+          <a:blip r:embed="rId2"/>
+          <a:stretch>
+            <a:fillRect/>
+          </a:stretch>
+        </p:blipFill>
+        <p:spPr>
+          <a:xfrm>
+            <a:off x="7284442" y="1514143"/>
+            <a:ext cx="4046290" cy="1110308"/>
+          </a:xfrm>
+          <a:prstGeom prst="rect">
+            <a:avLst/>
+          </a:prstGeom>
+          <a:ln>
+            <a:solidFill>
+              <a:schemeClr val="tx1"/>
+            </a:solidFill>
+          </a:ln>
+        </p:spPr>
+      </p:pic>
+      <p:pic>
+        <p:nvPicPr>
+          <p:cNvPr id="12" name="Picture 11">
+            <a:extLst>
+              <a:ext uri="{FF2B5EF4-FFF2-40B4-BE49-F238E27FC236}">
+                <a16:creationId xmlns:a16="http://schemas.microsoft.com/office/drawing/2014/main" id="{13E8D78C-A92B-4F87-AA42-994D1E96879C}"/>
+              </a:ext>
+            </a:extLst>
+          </p:cNvPr>
+          <p:cNvPicPr>
+            <a:picLocks noChangeAspect="1"/>
+          </p:cNvPicPr>
+          <p:nvPr/>
+        </p:nvPicPr>
+        <p:blipFill>
+          <a:blip r:embed="rId3"/>
+          <a:stretch>
+            <a:fillRect/>
+          </a:stretch>
+        </p:blipFill>
+        <p:spPr>
+          <a:xfrm>
+            <a:off x="7189366" y="3429000"/>
+            <a:ext cx="4236441" cy="1843443"/>
+          </a:xfrm>
+          <a:prstGeom prst="rect">
+            <a:avLst/>
+          </a:prstGeom>
+          <a:ln>
+            <a:solidFill>
+              <a:schemeClr val="tx1"/>
+            </a:solidFill>
+          </a:ln>
+        </p:spPr>
+      </p:pic>
+      <p:sp>
+        <p:nvSpPr>
+          <p:cNvPr id="13" name="TextBox 12">
+            <a:extLst>
+              <a:ext uri="{FF2B5EF4-FFF2-40B4-BE49-F238E27FC236}">
+                <a16:creationId xmlns:a16="http://schemas.microsoft.com/office/drawing/2014/main" id="{829EEE56-3FF8-42DA-9025-18581722748A}"/>
+              </a:ext>
+            </a:extLst>
+          </p:cNvPr>
+          <p:cNvSpPr txBox="1"/>
+          <p:nvPr/>
+        </p:nvSpPr>
+        <p:spPr>
+          <a:xfrm>
+            <a:off x="671116" y="5331275"/>
+            <a:ext cx="4236441" cy="646331"/>
+          </a:xfrm>
+          <a:prstGeom prst="rect">
+            <a:avLst/>
+          </a:prstGeom>
+          <a:noFill/>
+          <a:ln>
+            <a:solidFill>
+              <a:schemeClr val="tx1"/>
+            </a:solidFill>
+          </a:ln>
+        </p:spPr>
+        <p:txBody>
+          <a:bodyPr wrap="square" rtlCol="0">
+            <a:spAutoFit/>
+          </a:bodyPr>
+          <a:lstStyle/>
+          <a:p>
+            <a:r>
+              <a:rPr lang="en-US" b="1" dirty="0"/>
+              <a:t>Parameterize bilateral trade by sea routes:</a:t>
+            </a:r>
+          </a:p>
+          <a:p>
+            <a:r>
+              <a:rPr lang="en-US" dirty="0"/>
+              <a:t>Based on bilateral schema for piped gas</a:t>
+            </a:r>
+            <a:endParaRPr lang="en-AT" dirty="0"/>
+          </a:p>
+        </p:txBody>
+      </p:sp>
+      <p:cxnSp>
+        <p:nvCxnSpPr>
+          <p:cNvPr id="15" name="Straight Arrow Connector 14">
+            <a:extLst>
+              <a:ext uri="{FF2B5EF4-FFF2-40B4-BE49-F238E27FC236}">
+                <a16:creationId xmlns:a16="http://schemas.microsoft.com/office/drawing/2014/main" id="{28635690-836D-4E0D-B378-957C35505856}"/>
+              </a:ext>
+            </a:extLst>
+          </p:cNvPr>
+          <p:cNvCxnSpPr>
+            <a:cxnSpLocks/>
+            <a:stCxn id="4" idx="3"/>
+            <a:endCxn id="11" idx="1"/>
+          </p:cNvCxnSpPr>
+          <p:nvPr/>
+        </p:nvCxnSpPr>
+        <p:spPr>
+          <a:xfrm flipV="1">
+            <a:off x="4907559" y="2069297"/>
+            <a:ext cx="2376883" cy="164054"/>
+          </a:xfrm>
+          <a:prstGeom prst="straightConnector1">
+            <a:avLst/>
+          </a:prstGeom>
+          <a:ln>
+            <a:solidFill>
+              <a:schemeClr val="tx1"/>
+            </a:solidFill>
+            <a:tailEnd type="triangle"/>
+          </a:ln>
+        </p:spPr>
+        <p:style>
+          <a:lnRef idx="1">
+            <a:schemeClr val="accent1"/>
+          </a:lnRef>
+          <a:fillRef idx="0">
+            <a:schemeClr val="accent1"/>
+          </a:fillRef>
+          <a:effectRef idx="0">
+            <a:schemeClr val="accent1"/>
+          </a:effectRef>
+          <a:fontRef idx="minor">
+            <a:schemeClr val="tx1"/>
+          </a:fontRef>
+        </p:style>
+      </p:cxnSp>
+      <p:sp>
+        <p:nvSpPr>
+          <p:cNvPr id="17" name="TextBox 16">
+            <a:extLst>
+              <a:ext uri="{FF2B5EF4-FFF2-40B4-BE49-F238E27FC236}">
+                <a16:creationId xmlns:a16="http://schemas.microsoft.com/office/drawing/2014/main" id="{65DCE3F6-10BE-4840-B7C9-A884B15D101A}"/>
+              </a:ext>
+            </a:extLst>
+          </p:cNvPr>
+          <p:cNvSpPr txBox="1"/>
+          <p:nvPr/>
+        </p:nvSpPr>
+        <p:spPr>
+          <a:xfrm rot="21330823">
+            <a:off x="5436067" y="1848948"/>
+            <a:ext cx="1909198" cy="276999"/>
+          </a:xfrm>
+          <a:prstGeom prst="rect">
+            <a:avLst/>
+          </a:prstGeom>
+          <a:noFill/>
+        </p:spPr>
+        <p:txBody>
+          <a:bodyPr wrap="square" rtlCol="0">
+            <a:spAutoFit/>
+          </a:bodyPr>
+          <a:lstStyle/>
+          <a:p>
+            <a:r>
+              <a:rPr lang="en-US" sz="1200" dirty="0"/>
+              <a:t>Might look like</a:t>
+            </a:r>
+            <a:endParaRPr lang="en-AT" sz="1200" dirty="0"/>
+          </a:p>
+        </p:txBody>
+      </p:sp>
+      <p:cxnSp>
+        <p:nvCxnSpPr>
+          <p:cNvPr id="18" name="Straight Arrow Connector 17">
+            <a:extLst>
+              <a:ext uri="{FF2B5EF4-FFF2-40B4-BE49-F238E27FC236}">
+                <a16:creationId xmlns:a16="http://schemas.microsoft.com/office/drawing/2014/main" id="{CFE85081-4659-4A81-8C88-5373766909B8}"/>
+              </a:ext>
+            </a:extLst>
+          </p:cNvPr>
+          <p:cNvCxnSpPr>
+            <a:cxnSpLocks/>
+            <a:stCxn id="9" idx="3"/>
+            <a:endCxn id="12" idx="1"/>
+          </p:cNvCxnSpPr>
+          <p:nvPr/>
+        </p:nvCxnSpPr>
+        <p:spPr>
+          <a:xfrm>
+            <a:off x="4907558" y="3449231"/>
+            <a:ext cx="2281808" cy="901491"/>
+          </a:xfrm>
+          <a:prstGeom prst="straightConnector1">
+            <a:avLst/>
+          </a:prstGeom>
+          <a:ln>
+            <a:solidFill>
+              <a:schemeClr val="tx1"/>
+            </a:solidFill>
+            <a:tailEnd type="triangle"/>
+          </a:ln>
+        </p:spPr>
+        <p:style>
+          <a:lnRef idx="1">
+            <a:schemeClr val="accent1"/>
+          </a:lnRef>
+          <a:fillRef idx="0">
+            <a:schemeClr val="accent1"/>
+          </a:fillRef>
+          <a:effectRef idx="0">
+            <a:schemeClr val="accent1"/>
+          </a:effectRef>
+          <a:fontRef idx="minor">
+            <a:schemeClr val="tx1"/>
+          </a:fontRef>
+        </p:style>
+      </p:cxnSp>
+      <p:sp>
+        <p:nvSpPr>
+          <p:cNvPr id="19" name="TextBox 18">
+            <a:extLst>
+              <a:ext uri="{FF2B5EF4-FFF2-40B4-BE49-F238E27FC236}">
+                <a16:creationId xmlns:a16="http://schemas.microsoft.com/office/drawing/2014/main" id="{5EDE5E4A-EA41-4AD0-AC7B-455D8F0E9B17}"/>
+              </a:ext>
+            </a:extLst>
+          </p:cNvPr>
+          <p:cNvSpPr txBox="1"/>
+          <p:nvPr/>
+        </p:nvSpPr>
+        <p:spPr>
+          <a:xfrm rot="1415991">
+            <a:off x="5615042" y="3623440"/>
+            <a:ext cx="1221246" cy="276999"/>
+          </a:xfrm>
+          <a:prstGeom prst="rect">
+            <a:avLst/>
+          </a:prstGeom>
+          <a:noFill/>
+        </p:spPr>
+        <p:txBody>
+          <a:bodyPr wrap="square" rtlCol="0">
+            <a:spAutoFit/>
+          </a:bodyPr>
+          <a:lstStyle/>
+          <a:p>
+            <a:r>
+              <a:rPr lang="en-US" sz="1200" dirty="0"/>
+              <a:t>Might look like</a:t>
+            </a:r>
+            <a:endParaRPr lang="en-AT" sz="1200" dirty="0"/>
+          </a:p>
+        </p:txBody>
+      </p:sp>
+      <p:sp>
+        <p:nvSpPr>
+          <p:cNvPr id="21" name="TextBox 20">
+            <a:extLst>
+              <a:ext uri="{FF2B5EF4-FFF2-40B4-BE49-F238E27FC236}">
+                <a16:creationId xmlns:a16="http://schemas.microsoft.com/office/drawing/2014/main" id="{309F8218-C102-4268-94F8-82EFB67C7310}"/>
+              </a:ext>
+            </a:extLst>
+          </p:cNvPr>
+          <p:cNvSpPr txBox="1"/>
+          <p:nvPr/>
+        </p:nvSpPr>
+        <p:spPr>
+          <a:xfrm>
+            <a:off x="671116" y="6255346"/>
+            <a:ext cx="3256362" cy="369332"/>
+          </a:xfrm>
+          <a:prstGeom prst="rect">
+            <a:avLst/>
+          </a:prstGeom>
+          <a:noFill/>
+          <a:ln>
+            <a:solidFill>
+              <a:schemeClr val="tx1"/>
+            </a:solidFill>
+          </a:ln>
+        </p:spPr>
+        <p:txBody>
+          <a:bodyPr wrap="square" rtlCol="0">
+            <a:spAutoFit/>
+          </a:bodyPr>
+          <a:lstStyle/>
+          <a:p>
+            <a:r>
+              <a:rPr lang="en-US" b="1" dirty="0"/>
+              <a:t>Run MESSAGE for each scenario</a:t>
+            </a:r>
+            <a:endParaRPr lang="en-AT" dirty="0"/>
+          </a:p>
+        </p:txBody>
+      </p:sp>
+      <p:sp>
+        <p:nvSpPr>
+          <p:cNvPr id="24" name="TextBox 23">
+            <a:extLst>
+              <a:ext uri="{FF2B5EF4-FFF2-40B4-BE49-F238E27FC236}">
+                <a16:creationId xmlns:a16="http://schemas.microsoft.com/office/drawing/2014/main" id="{38A8966E-84CE-4169-8A39-B36559E3F1DF}"/>
+              </a:ext>
+            </a:extLst>
+          </p:cNvPr>
+          <p:cNvSpPr txBox="1"/>
+          <p:nvPr/>
+        </p:nvSpPr>
+        <p:spPr>
+          <a:xfrm>
+            <a:off x="4288169" y="6255346"/>
+            <a:ext cx="2674693" cy="369332"/>
+          </a:xfrm>
+          <a:prstGeom prst="rect">
+            <a:avLst/>
+          </a:prstGeom>
+          <a:noFill/>
+          <a:ln>
+            <a:solidFill>
+              <a:schemeClr val="tx1"/>
+            </a:solidFill>
+          </a:ln>
+        </p:spPr>
+        <p:txBody>
+          <a:bodyPr wrap="square" rtlCol="0">
+            <a:spAutoFit/>
+          </a:bodyPr>
+          <a:lstStyle/>
+          <a:p>
+            <a:r>
+              <a:rPr lang="en-US" b="1" dirty="0"/>
+              <a:t>Compare to gravity model</a:t>
+            </a:r>
+            <a:endParaRPr lang="en-AT" dirty="0"/>
+          </a:p>
+        </p:txBody>
+      </p:sp>
+      <p:cxnSp>
+        <p:nvCxnSpPr>
+          <p:cNvPr id="25" name="Straight Arrow Connector 24">
+            <a:extLst>
+              <a:ext uri="{FF2B5EF4-FFF2-40B4-BE49-F238E27FC236}">
+                <a16:creationId xmlns:a16="http://schemas.microsoft.com/office/drawing/2014/main" id="{03CC90DB-2A53-424C-B71A-14B7CFF4A6C6}"/>
+              </a:ext>
+            </a:extLst>
+          </p:cNvPr>
+          <p:cNvCxnSpPr>
+            <a:cxnSpLocks/>
+            <a:stCxn id="4" idx="2"/>
+            <a:endCxn id="9" idx="0"/>
+          </p:cNvCxnSpPr>
+          <p:nvPr/>
+        </p:nvCxnSpPr>
+        <p:spPr>
+          <a:xfrm flipH="1">
+            <a:off x="2789338" y="2695016"/>
+            <a:ext cx="1" cy="292550"/>
+          </a:xfrm>
+          <a:prstGeom prst="straightConnector1">
+            <a:avLst/>
+          </a:prstGeom>
+          <a:ln w="28575">
+            <a:solidFill>
+              <a:schemeClr val="accent6"/>
+            </a:solidFill>
+            <a:headEnd type="none" w="med" len="med"/>
+            <a:tailEnd type="arrow" w="med" len="med"/>
+          </a:ln>
+        </p:spPr>
+        <p:style>
+          <a:lnRef idx="1">
+            <a:schemeClr val="accent1"/>
+          </a:lnRef>
+          <a:fillRef idx="0">
+            <a:schemeClr val="accent1"/>
+          </a:fillRef>
+          <a:effectRef idx="0">
+            <a:schemeClr val="accent1"/>
+          </a:effectRef>
+          <a:fontRef idx="minor">
+            <a:schemeClr val="tx1"/>
+          </a:fontRef>
+        </p:style>
+      </p:cxnSp>
+      <p:cxnSp>
+        <p:nvCxnSpPr>
+          <p:cNvPr id="29" name="Straight Arrow Connector 28">
+            <a:extLst>
+              <a:ext uri="{FF2B5EF4-FFF2-40B4-BE49-F238E27FC236}">
+                <a16:creationId xmlns:a16="http://schemas.microsoft.com/office/drawing/2014/main" id="{04E9F84C-1BC8-4A03-BE78-5F20785174CF}"/>
+              </a:ext>
+            </a:extLst>
+          </p:cNvPr>
+          <p:cNvCxnSpPr>
+            <a:cxnSpLocks/>
+          </p:cNvCxnSpPr>
+          <p:nvPr/>
+        </p:nvCxnSpPr>
+        <p:spPr>
+          <a:xfrm flipH="1">
+            <a:off x="2789336" y="3912474"/>
+            <a:ext cx="1" cy="292550"/>
+          </a:xfrm>
+          <a:prstGeom prst="straightConnector1">
+            <a:avLst/>
+          </a:prstGeom>
+          <a:ln w="28575">
+            <a:solidFill>
+              <a:schemeClr val="accent6"/>
+            </a:solidFill>
+            <a:headEnd type="none" w="med" len="med"/>
+            <a:tailEnd type="arrow" w="med" len="med"/>
+          </a:ln>
+        </p:spPr>
+        <p:style>
+          <a:lnRef idx="1">
+            <a:schemeClr val="accent1"/>
+          </a:lnRef>
+          <a:fillRef idx="0">
+            <a:schemeClr val="accent1"/>
+          </a:fillRef>
+          <a:effectRef idx="0">
+            <a:schemeClr val="accent1"/>
+          </a:effectRef>
+          <a:fontRef idx="minor">
+            <a:schemeClr val="tx1"/>
+          </a:fontRef>
+        </p:style>
+      </p:cxnSp>
+      <p:cxnSp>
+        <p:nvCxnSpPr>
+          <p:cNvPr id="30" name="Straight Arrow Connector 29">
+            <a:extLst>
+              <a:ext uri="{FF2B5EF4-FFF2-40B4-BE49-F238E27FC236}">
+                <a16:creationId xmlns:a16="http://schemas.microsoft.com/office/drawing/2014/main" id="{E2664B05-E0D8-4EA7-8F95-D47C1AC3395F}"/>
+              </a:ext>
+            </a:extLst>
+          </p:cNvPr>
+          <p:cNvCxnSpPr>
+            <a:cxnSpLocks/>
+            <a:stCxn id="8" idx="2"/>
+            <a:endCxn id="13" idx="0"/>
+          </p:cNvCxnSpPr>
+          <p:nvPr/>
+        </p:nvCxnSpPr>
+        <p:spPr>
+          <a:xfrm>
+            <a:off x="2789337" y="5121512"/>
+            <a:ext cx="0" cy="209763"/>
+          </a:xfrm>
+          <a:prstGeom prst="straightConnector1">
+            <a:avLst/>
+          </a:prstGeom>
+          <a:ln w="28575">
+            <a:solidFill>
+              <a:schemeClr val="accent6"/>
+            </a:solidFill>
+            <a:headEnd type="none" w="med" len="med"/>
+            <a:tailEnd type="arrow" w="med" len="med"/>
+          </a:ln>
+        </p:spPr>
+        <p:style>
+          <a:lnRef idx="1">
+            <a:schemeClr val="accent1"/>
+          </a:lnRef>
+          <a:fillRef idx="0">
+            <a:schemeClr val="accent1"/>
+          </a:fillRef>
+          <a:effectRef idx="0">
+            <a:schemeClr val="accent1"/>
+          </a:effectRef>
+          <a:fontRef idx="minor">
+            <a:schemeClr val="tx1"/>
+          </a:fontRef>
+        </p:style>
+      </p:cxnSp>
+      <p:cxnSp>
+        <p:nvCxnSpPr>
+          <p:cNvPr id="33" name="Straight Arrow Connector 32">
+            <a:extLst>
+              <a:ext uri="{FF2B5EF4-FFF2-40B4-BE49-F238E27FC236}">
+                <a16:creationId xmlns:a16="http://schemas.microsoft.com/office/drawing/2014/main" id="{F6BD8363-31B2-4F29-885B-D64D931159C0}"/>
+              </a:ext>
+            </a:extLst>
+          </p:cNvPr>
+          <p:cNvCxnSpPr>
+            <a:cxnSpLocks/>
+          </p:cNvCxnSpPr>
+          <p:nvPr/>
+        </p:nvCxnSpPr>
+        <p:spPr>
+          <a:xfrm>
+            <a:off x="2789336" y="5977606"/>
+            <a:ext cx="0" cy="277740"/>
+          </a:xfrm>
+          <a:prstGeom prst="straightConnector1">
+            <a:avLst/>
+          </a:prstGeom>
+          <a:ln w="28575">
+            <a:solidFill>
+              <a:schemeClr val="accent6"/>
+            </a:solidFill>
+            <a:headEnd type="none" w="med" len="med"/>
+            <a:tailEnd type="arrow" w="med" len="med"/>
+          </a:ln>
+        </p:spPr>
+        <p:style>
+          <a:lnRef idx="1">
+            <a:schemeClr val="accent1"/>
+          </a:lnRef>
+          <a:fillRef idx="0">
+            <a:schemeClr val="accent1"/>
+          </a:fillRef>
+          <a:effectRef idx="0">
+            <a:schemeClr val="accent1"/>
+          </a:effectRef>
+          <a:fontRef idx="minor">
+            <a:schemeClr val="tx1"/>
+          </a:fontRef>
+        </p:style>
+      </p:cxnSp>
+      <p:cxnSp>
+        <p:nvCxnSpPr>
+          <p:cNvPr id="35" name="Straight Arrow Connector 34">
+            <a:extLst>
+              <a:ext uri="{FF2B5EF4-FFF2-40B4-BE49-F238E27FC236}">
+                <a16:creationId xmlns:a16="http://schemas.microsoft.com/office/drawing/2014/main" id="{AB11D4AC-7E67-47AC-9381-FB34E123E944}"/>
+              </a:ext>
+            </a:extLst>
+          </p:cNvPr>
+          <p:cNvCxnSpPr>
+            <a:cxnSpLocks/>
+            <a:endCxn id="24" idx="1"/>
+          </p:cNvCxnSpPr>
+          <p:nvPr/>
+        </p:nvCxnSpPr>
+        <p:spPr>
+          <a:xfrm>
+            <a:off x="3927478" y="6440012"/>
+            <a:ext cx="360691" cy="0"/>
+          </a:xfrm>
+          <a:prstGeom prst="straightConnector1">
+            <a:avLst/>
+          </a:prstGeom>
+          <a:ln w="28575">
+            <a:solidFill>
+              <a:schemeClr val="accent6"/>
+            </a:solidFill>
+            <a:headEnd type="none" w="med" len="med"/>
+            <a:tailEnd type="arrow" w="med" len="med"/>
+          </a:ln>
+        </p:spPr>
+        <p:style>
+          <a:lnRef idx="1">
+            <a:schemeClr val="accent1"/>
+          </a:lnRef>
+          <a:fillRef idx="0">
+            <a:schemeClr val="accent1"/>
+          </a:fillRef>
+          <a:effectRef idx="0">
+            <a:schemeClr val="accent1"/>
+          </a:effectRef>
+          <a:fontRef idx="minor">
+            <a:schemeClr val="tx1"/>
+          </a:fontRef>
+        </p:style>
+      </p:cxnSp>
     </p:spTree>
     <p:extLst>
       <p:ext uri="{BB962C8B-B14F-4D97-AF65-F5344CB8AC3E}">
@@ -13577,37 +14297,186 @@
             <p:ph idx="1"/>
           </p:nvPr>
         </p:nvSpPr>
-        <p:spPr/>
+        <p:spPr>
+          <a:xfrm>
+            <a:off x="1676400" y="6585358"/>
+            <a:ext cx="10515600" cy="264049"/>
+          </a:xfrm>
+        </p:spPr>
         <p:txBody>
-          <a:bodyPr/>
+          <a:bodyPr>
+            <a:normAutofit fontScale="92500" lnSpcReduction="20000"/>
+          </a:bodyPr>
           <a:lstStyle/>
           <a:p>
-            <a:pPr marL="0" indent="0">
+            <a:pPr marL="0" indent="0" algn="r">
               <a:buNone/>
             </a:pPr>
             <a:r>
-              <a:rPr lang="en-US" dirty="0"/>
-              <a:t>Energy: </a:t>
+              <a:rPr lang="en-US" sz="1600" dirty="0"/>
+              <a:t>Notes: 1) commodities are not disaggregated yet, 2) data are truncated at 1000 ($/</a:t>
             </a:r>
-          </a:p>
-          <a:p>
-            <a:pPr lvl="1"/>
-            <a:endParaRPr lang="en-US" dirty="0"/>
-          </a:p>
-          <a:p>
-            <a:pPr lvl="1"/>
-            <a:endParaRPr lang="en-US" dirty="0"/>
-          </a:p>
-          <a:p>
-            <a:pPr lvl="1"/>
-            <a:endParaRPr lang="en-US" dirty="0"/>
-          </a:p>
-          <a:p>
-            <a:pPr lvl="1"/>
-            <a:endParaRPr lang="en-AT" dirty="0"/>
+            <a:r>
+              <a:rPr lang="en-US" sz="1600" dirty="0" err="1"/>
+              <a:t>GWa</a:t>
+            </a:r>
+            <a:r>
+              <a:rPr lang="en-US" sz="1600" dirty="0"/>
+              <a:t>)</a:t>
+            </a:r>
           </a:p>
         </p:txBody>
       </p:sp>
+      <p:pic>
+        <p:nvPicPr>
+          <p:cNvPr id="5" name="Picture 4">
+            <a:extLst>
+              <a:ext uri="{FF2B5EF4-FFF2-40B4-BE49-F238E27FC236}">
+                <a16:creationId xmlns:a16="http://schemas.microsoft.com/office/drawing/2014/main" id="{52F5AFEA-7D0F-4DA4-8D0C-B7400DE34D2F}"/>
+              </a:ext>
+            </a:extLst>
+          </p:cNvPr>
+          <p:cNvPicPr>
+            <a:picLocks noChangeAspect="1"/>
+          </p:cNvPicPr>
+          <p:nvPr/>
+        </p:nvPicPr>
+        <p:blipFill>
+          <a:blip r:embed="rId2"/>
+          <a:stretch>
+            <a:fillRect/>
+          </a:stretch>
+        </p:blipFill>
+        <p:spPr>
+          <a:xfrm>
+            <a:off x="668453" y="1690688"/>
+            <a:ext cx="3657600" cy="2373778"/>
+          </a:xfrm>
+          <a:prstGeom prst="rect">
+            <a:avLst/>
+          </a:prstGeom>
+        </p:spPr>
+      </p:pic>
+      <p:pic>
+        <p:nvPicPr>
+          <p:cNvPr id="6" name="Picture 5">
+            <a:extLst>
+              <a:ext uri="{FF2B5EF4-FFF2-40B4-BE49-F238E27FC236}">
+                <a16:creationId xmlns:a16="http://schemas.microsoft.com/office/drawing/2014/main" id="{74BA7BCE-86CA-425C-9BC4-91984C51CADE}"/>
+              </a:ext>
+            </a:extLst>
+          </p:cNvPr>
+          <p:cNvPicPr>
+            <a:picLocks noChangeAspect="1"/>
+          </p:cNvPicPr>
+          <p:nvPr/>
+        </p:nvPicPr>
+        <p:blipFill>
+          <a:blip r:embed="rId3"/>
+          <a:stretch>
+            <a:fillRect/>
+          </a:stretch>
+        </p:blipFill>
+        <p:spPr>
+          <a:xfrm>
+            <a:off x="838200" y="4064466"/>
+            <a:ext cx="3657600" cy="2344615"/>
+          </a:xfrm>
+          <a:prstGeom prst="rect">
+            <a:avLst/>
+          </a:prstGeom>
+        </p:spPr>
+      </p:pic>
+      <p:pic>
+        <p:nvPicPr>
+          <p:cNvPr id="7" name="Picture 6">
+            <a:extLst>
+              <a:ext uri="{FF2B5EF4-FFF2-40B4-BE49-F238E27FC236}">
+                <a16:creationId xmlns:a16="http://schemas.microsoft.com/office/drawing/2014/main" id="{B4C77247-0604-4F6C-B2F2-3A103CC62A98}"/>
+              </a:ext>
+            </a:extLst>
+          </p:cNvPr>
+          <p:cNvPicPr>
+            <a:picLocks noChangeAspect="1"/>
+          </p:cNvPicPr>
+          <p:nvPr/>
+        </p:nvPicPr>
+        <p:blipFill>
+          <a:blip r:embed="rId4"/>
+          <a:stretch>
+            <a:fillRect/>
+          </a:stretch>
+        </p:blipFill>
+        <p:spPr>
+          <a:xfrm>
+            <a:off x="4665547" y="1709806"/>
+            <a:ext cx="3657600" cy="2354660"/>
+          </a:xfrm>
+          <a:prstGeom prst="rect">
+            <a:avLst/>
+          </a:prstGeom>
+        </p:spPr>
+      </p:pic>
+      <p:pic>
+        <p:nvPicPr>
+          <p:cNvPr id="8" name="Picture 7">
+            <a:extLst>
+              <a:ext uri="{FF2B5EF4-FFF2-40B4-BE49-F238E27FC236}">
+                <a16:creationId xmlns:a16="http://schemas.microsoft.com/office/drawing/2014/main" id="{CEC7B54C-3FB3-4E83-9F9C-EDF1DD6707F6}"/>
+              </a:ext>
+            </a:extLst>
+          </p:cNvPr>
+          <p:cNvPicPr>
+            <a:picLocks noChangeAspect="1"/>
+          </p:cNvPicPr>
+          <p:nvPr/>
+        </p:nvPicPr>
+        <p:blipFill>
+          <a:blip r:embed="rId5"/>
+          <a:stretch>
+            <a:fillRect/>
+          </a:stretch>
+        </p:blipFill>
+        <p:spPr>
+          <a:xfrm>
+            <a:off x="4665547" y="4064466"/>
+            <a:ext cx="3657600" cy="2367185"/>
+          </a:xfrm>
+          <a:prstGeom prst="rect">
+            <a:avLst/>
+          </a:prstGeom>
+        </p:spPr>
+      </p:pic>
+      <p:pic>
+        <p:nvPicPr>
+          <p:cNvPr id="9" name="Picture 8">
+            <a:extLst>
+              <a:ext uri="{FF2B5EF4-FFF2-40B4-BE49-F238E27FC236}">
+                <a16:creationId xmlns:a16="http://schemas.microsoft.com/office/drawing/2014/main" id="{5F7F5985-8D74-47E7-8995-F8752E840BF4}"/>
+              </a:ext>
+            </a:extLst>
+          </p:cNvPr>
+          <p:cNvPicPr>
+            <a:picLocks noChangeAspect="1"/>
+          </p:cNvPicPr>
+          <p:nvPr/>
+        </p:nvPicPr>
+        <p:blipFill>
+          <a:blip r:embed="rId6"/>
+          <a:stretch>
+            <a:fillRect/>
+          </a:stretch>
+        </p:blipFill>
+        <p:spPr>
+          <a:xfrm>
+            <a:off x="8492894" y="1712688"/>
+            <a:ext cx="3657600" cy="2375510"/>
+          </a:xfrm>
+          <a:prstGeom prst="rect">
+            <a:avLst/>
+          </a:prstGeom>
+        </p:spPr>
+      </p:pic>
     </p:spTree>
     <p:extLst>
       <p:ext uri="{BB962C8B-B14F-4D97-AF65-F5344CB8AC3E}">

</xml_diff>